<commit_message>
add 3 songs, update 2 songs
</commit_message>
<xml_diff>
--- a/Lễ Giao Thừa.pptx
+++ b/Lễ Giao Thừa.pptx
@@ -29,12 +29,12 @@
     <p:sldId id="4653" r:id="rId20"/>
     <p:sldId id="4654" r:id="rId21"/>
     <p:sldId id="4021" r:id="rId22"/>
-    <p:sldId id="5063" r:id="rId23"/>
-    <p:sldId id="5064" r:id="rId24"/>
-    <p:sldId id="5065" r:id="rId25"/>
-    <p:sldId id="5068" r:id="rId26"/>
-    <p:sldId id="5069" r:id="rId27"/>
-    <p:sldId id="5070" r:id="rId28"/>
+    <p:sldId id="5103" r:id="rId23"/>
+    <p:sldId id="5068" r:id="rId24"/>
+    <p:sldId id="5070" r:id="rId25"/>
+    <p:sldId id="5104" r:id="rId26"/>
+    <p:sldId id="5105" r:id="rId27"/>
+    <p:sldId id="5106" r:id="rId28"/>
     <p:sldId id="964" r:id="rId29"/>
     <p:sldId id="5071" r:id="rId30"/>
     <p:sldId id="5072" r:id="rId31"/>
@@ -160,7 +160,7 @@
   </p:defaultTextStyle>
   <p:extLst>
     <p:ext uri="{EFAFB233-063F-42B5-8137-9DF3F51BA10A}">
-      <p15:sldGuideLst xmlns:p15="http://schemas.microsoft.com/office/powerpoint/2012/main">
+      <p15:sldGuideLst xmlns:p15="http://schemas.microsoft.com/office/powerpoint/2012/main" xmlns="">
         <p15:guide id="1" orient="horz" pos="2160">
           <p15:clr>
             <a:srgbClr val="A4A3A4"/>
@@ -4530,6 +4530,13 @@
     <a:masterClrMapping/>
   </p:clrMapOvr>
   <p:transition/>
+  <p:timing>
+    <p:tnLst>
+      <p:par>
+        <p:cTn id="1" dur="indefinite" restart="never" nodeType="tmRoot"/>
+      </p:par>
+    </p:tnLst>
+  </p:timing>
 </p:sld>
 </file>
 
@@ -4695,6 +4702,13 @@
     <a:masterClrMapping/>
   </p:clrMapOvr>
   <p:transition/>
+  <p:timing>
+    <p:tnLst>
+      <p:par>
+        <p:cTn id="1" dur="indefinite" restart="never" nodeType="tmRoot"/>
+      </p:par>
+    </p:tnLst>
+  </p:timing>
 </p:sld>
 </file>
 
@@ -4860,6 +4874,13 @@
     <a:masterClrMapping/>
   </p:clrMapOvr>
   <p:transition/>
+  <p:timing>
+    <p:tnLst>
+      <p:par>
+        <p:cTn id="1" dur="indefinite" restart="never" nodeType="tmRoot"/>
+      </p:par>
+    </p:tnLst>
+  </p:timing>
 </p:sld>
 </file>
 
@@ -5051,6 +5072,13 @@
     <a:masterClrMapping/>
   </p:clrMapOvr>
   <p:transition/>
+  <p:timing>
+    <p:tnLst>
+      <p:par>
+        <p:cTn id="1" dur="indefinite" restart="never" nodeType="tmRoot"/>
+      </p:par>
+    </p:tnLst>
+  </p:timing>
 </p:sld>
 </file>
 
@@ -5228,6 +5256,13 @@
     <a:masterClrMapping/>
   </p:clrMapOvr>
   <p:transition/>
+  <p:timing>
+    <p:tnLst>
+      <p:par>
+        <p:cTn id="1" dur="indefinite" restart="never" nodeType="tmRoot"/>
+      </p:par>
+    </p:tnLst>
+  </p:timing>
 </p:sld>
 </file>
 
@@ -5393,6 +5428,13 @@
     <a:masterClrMapping/>
   </p:clrMapOvr>
   <p:transition/>
+  <p:timing>
+    <p:tnLst>
+      <p:par>
+        <p:cTn id="1" dur="indefinite" restart="never" nodeType="tmRoot"/>
+      </p:par>
+    </p:tnLst>
+  </p:timing>
 </p:sld>
 </file>
 
@@ -5584,6 +5626,13 @@
     <a:masterClrMapping/>
   </p:clrMapOvr>
   <p:transition/>
+  <p:timing>
+    <p:tnLst>
+      <p:par>
+        <p:cTn id="1" dur="indefinite" restart="never" nodeType="tmRoot"/>
+      </p:par>
+    </p:tnLst>
+  </p:timing>
 </p:sld>
 </file>
 
@@ -5749,6 +5798,13 @@
     <a:masterClrMapping/>
   </p:clrMapOvr>
   <p:transition/>
+  <p:timing>
+    <p:tnLst>
+      <p:par>
+        <p:cTn id="1" dur="indefinite" restart="never" nodeType="tmRoot"/>
+      </p:par>
+    </p:tnLst>
+  </p:timing>
 </p:sld>
 </file>
 
@@ -5914,6 +5970,13 @@
     <a:masterClrMapping/>
   </p:clrMapOvr>
   <p:transition/>
+  <p:timing>
+    <p:tnLst>
+      <p:par>
+        <p:cTn id="1" dur="indefinite" restart="never" nodeType="tmRoot"/>
+      </p:par>
+    </p:tnLst>
+  </p:timing>
 </p:sld>
 </file>
 
@@ -6105,6 +6168,13 @@
     <a:masterClrMapping/>
   </p:clrMapOvr>
   <p:transition/>
+  <p:timing>
+    <p:tnLst>
+      <p:par>
+        <p:cTn id="1" dur="indefinite" restart="never" nodeType="tmRoot"/>
+      </p:par>
+    </p:tnLst>
+  </p:timing>
 </p:sld>
 </file>
 
@@ -6440,6 +6510,13 @@
     <a:masterClrMapping/>
   </p:clrMapOvr>
   <p:transition/>
+  <p:timing>
+    <p:tnLst>
+      <p:par>
+        <p:cTn id="1" dur="indefinite" restart="never" nodeType="tmRoot"/>
+      </p:par>
+    </p:tnLst>
+  </p:timing>
 </p:sld>
 </file>
 
@@ -6558,6 +6635,13 @@
     <a:masterClrMapping/>
   </p:clrMapOvr>
   <p:transition/>
+  <p:timing>
+    <p:tnLst>
+      <p:par>
+        <p:cTn id="1" dur="indefinite" restart="never" nodeType="tmRoot"/>
+      </p:par>
+    </p:tnLst>
+  </p:timing>
 </p:sld>
 </file>
 
@@ -6841,6 +6925,13 @@
     <a:masterClrMapping/>
   </p:clrMapOvr>
   <p:transition/>
+  <p:timing>
+    <p:tnLst>
+      <p:par>
+        <p:cTn id="1" dur="indefinite" restart="never" nodeType="tmRoot"/>
+      </p:par>
+    </p:tnLst>
+  </p:timing>
 </p:sld>
 </file>
 
@@ -7006,6 +7097,13 @@
     <a:masterClrMapping/>
   </p:clrMapOvr>
   <p:transition/>
+  <p:timing>
+    <p:tnLst>
+      <p:par>
+        <p:cTn id="1" dur="indefinite" restart="never" nodeType="tmRoot"/>
+      </p:par>
+    </p:tnLst>
+  </p:timing>
 </p:sld>
 </file>
 
@@ -7148,7 +7246,7 @@
               <a:rPr lang="vi-VN" sz="5400" b="1" dirty="0">
                 <a:latin typeface="+mj-lt"/>
               </a:rPr>
-              <a:t>ĐK. Dâng lên Cha đây bánh rượu thơm nồng là lao công ngày tháng nơi nương đồng. Bàn tay con hôm sớm vun trồng ngày đêm mong cho lúa trổ bông. </a:t>
+              <a:t>2. Ngày đầu xuân xin dâng lên Cha nén hương trầm ngào ngạt thơm ngút bay. Tựa câu kinh trong sương ban mai nguyện Ngài thương đón nhận về thiên cung.</a:t>
             </a:r>
             <a:endParaRPr lang="vi-VN" sz="5400" b="1" dirty="0">
               <a:solidFill>
@@ -7163,7 +7261,7 @@
     </p:spTree>
     <p:extLst>
       <p:ext uri="{BB962C8B-B14F-4D97-AF65-F5344CB8AC3E}">
-        <p14:creationId xmlns:p14="http://schemas.microsoft.com/office/powerpoint/2010/main" val="557052082"/>
+        <p14:creationId xmlns:p14="http://schemas.microsoft.com/office/powerpoint/2010/main" val="3187415602"/>
       </p:ext>
     </p:extLst>
   </p:cSld>
@@ -7171,6 +7269,13 @@
     <a:masterClrMapping/>
   </p:clrMapOvr>
   <p:transition/>
+  <p:timing>
+    <p:tnLst>
+      <p:par>
+        <p:cTn id="1" dur="indefinite" restart="never" nodeType="tmRoot"/>
+      </p:par>
+    </p:tnLst>
+  </p:timing>
 </p:sld>
 </file>
 
@@ -7313,7 +7418,7 @@
               <a:rPr lang="vi-VN" sz="5400" b="1" dirty="0">
                 <a:latin typeface="+mj-lt"/>
               </a:rPr>
-              <a:t>Dâng lên Cha dâng trót cả tấm lòng nguyện Cha thương nhận lễ vật mọn hèn và ban cho ân phúc muôn vàn đời con luôn vui sống bình an.</a:t>
+              <a:t>ĐK. Dâng lên Cha đây bánh rượu thơm nồng là lao công ngày tháng nơi nương đồng. Bàn tay con hôm sớm vun trồng ngày đêm mong cho lúa trổ bông. </a:t>
             </a:r>
             <a:endParaRPr lang="vi-VN" sz="5400" b="1" dirty="0">
               <a:solidFill>
@@ -7328,7 +7433,7 @@
     </p:spTree>
     <p:extLst>
       <p:ext uri="{BB962C8B-B14F-4D97-AF65-F5344CB8AC3E}">
-        <p14:creationId xmlns:p14="http://schemas.microsoft.com/office/powerpoint/2010/main" val="1731609747"/>
+        <p14:creationId xmlns:p14="http://schemas.microsoft.com/office/powerpoint/2010/main" val="598750983"/>
       </p:ext>
     </p:extLst>
   </p:cSld>
@@ -7336,6 +7441,13 @@
     <a:masterClrMapping/>
   </p:clrMapOvr>
   <p:transition/>
+  <p:timing>
+    <p:tnLst>
+      <p:par>
+        <p:cTn id="1" dur="indefinite" restart="never" nodeType="tmRoot"/>
+      </p:par>
+    </p:tnLst>
+  </p:timing>
 </p:sld>
 </file>
 
@@ -7478,7 +7590,7 @@
               <a:rPr lang="vi-VN" sz="5400" b="1" dirty="0">
                 <a:latin typeface="+mj-lt"/>
               </a:rPr>
-              <a:t>2. Ngày đầu xuân xin dâng lên Cha nén hương trầm ngào ngạt thơm ngút bay. Tựa câu kinh trong sương ban mai nguyện Ngài thương đón nhận về thiên cung.</a:t>
+              <a:t>Dâng lên Cha dâng trót cả tấm lòng nguyện Cha thương nhận lễ vật mọn hèn và ban cho ân phúc muôn vàn đời con luôn vui sống bình an.</a:t>
             </a:r>
             <a:endParaRPr lang="vi-VN" sz="5400" b="1" dirty="0">
               <a:solidFill>
@@ -7493,7 +7605,7 @@
     </p:spTree>
     <p:extLst>
       <p:ext uri="{BB962C8B-B14F-4D97-AF65-F5344CB8AC3E}">
-        <p14:creationId xmlns:p14="http://schemas.microsoft.com/office/powerpoint/2010/main" val="2102593530"/>
+        <p14:creationId xmlns:p14="http://schemas.microsoft.com/office/powerpoint/2010/main" val="78453344"/>
       </p:ext>
     </p:extLst>
   </p:cSld>
@@ -7501,6 +7613,13 @@
     <a:masterClrMapping/>
   </p:clrMapOvr>
   <p:transition/>
+  <p:timing>
+    <p:tnLst>
+      <p:par>
+        <p:cTn id="1" dur="indefinite" restart="never" nodeType="tmRoot"/>
+      </p:par>
+    </p:tnLst>
+  </p:timing>
 </p:sld>
 </file>
 
@@ -7643,7 +7762,7 @@
               <a:rPr lang="vi-VN" sz="5400" b="1" dirty="0">
                 <a:latin typeface="+mj-lt"/>
               </a:rPr>
-              <a:t>ĐK. Dâng lên Cha đây bánh rượu thơm nồng là lao công ngày tháng nơi nương đồng. Bàn tay con hôm sớm vun trồng ngày đêm mong cho lúa trổ bông. </a:t>
+              <a:t>3. Ngày đầu xuân xin dâng lên Cha trái thơm nồng tràn đầy bao ước mơ. Đời trần gian bao nhiêu gian nan nguyện cho con vững một niềm tin yêu.</a:t>
             </a:r>
             <a:endParaRPr lang="vi-VN" sz="5400" b="1" dirty="0">
               <a:solidFill>
@@ -7658,7 +7777,7 @@
     </p:spTree>
     <p:extLst>
       <p:ext uri="{BB962C8B-B14F-4D97-AF65-F5344CB8AC3E}">
-        <p14:creationId xmlns:p14="http://schemas.microsoft.com/office/powerpoint/2010/main" val="598750983"/>
+        <p14:creationId xmlns:p14="http://schemas.microsoft.com/office/powerpoint/2010/main" val="1113280665"/>
       </p:ext>
     </p:extLst>
   </p:cSld>
@@ -7666,6 +7785,13 @@
     <a:masterClrMapping/>
   </p:clrMapOvr>
   <p:transition/>
+  <p:timing>
+    <p:tnLst>
+      <p:par>
+        <p:cTn id="1" dur="indefinite" restart="never" nodeType="tmRoot"/>
+      </p:par>
+    </p:tnLst>
+  </p:timing>
 </p:sld>
 </file>
 
@@ -7808,7 +7934,7 @@
               <a:rPr lang="vi-VN" sz="5400" b="1" dirty="0">
                 <a:latin typeface="+mj-lt"/>
               </a:rPr>
-              <a:t>Dâng lên Cha dâng trót cả tấm lòng nguyện Cha thương nhận lễ vật mọn hèn và ban cho ân phúc muôn vàn đời con luôn vui sống bình an.</a:t>
+              <a:t>ĐK. Dâng lên Cha đây bánh rượu thơm nồng là lao công ngày tháng nơi nương đồng. Bàn tay con hôm sớm vun trồng ngày đêm mong cho lúa trổ bông. </a:t>
             </a:r>
             <a:endParaRPr lang="vi-VN" sz="5400" b="1" dirty="0">
               <a:solidFill>
@@ -7823,7 +7949,7 @@
     </p:spTree>
     <p:extLst>
       <p:ext uri="{BB962C8B-B14F-4D97-AF65-F5344CB8AC3E}">
-        <p14:creationId xmlns:p14="http://schemas.microsoft.com/office/powerpoint/2010/main" val="4032046601"/>
+        <p14:creationId xmlns:p14="http://schemas.microsoft.com/office/powerpoint/2010/main" val="3531784242"/>
       </p:ext>
     </p:extLst>
   </p:cSld>
@@ -7831,6 +7957,13 @@
     <a:masterClrMapping/>
   </p:clrMapOvr>
   <p:transition/>
+  <p:timing>
+    <p:tnLst>
+      <p:par>
+        <p:cTn id="1" dur="indefinite" restart="never" nodeType="tmRoot"/>
+      </p:par>
+    </p:tnLst>
+  </p:timing>
 </p:sld>
 </file>
 
@@ -7988,7 +8121,7 @@
     </p:spTree>
     <p:extLst>
       <p:ext uri="{BB962C8B-B14F-4D97-AF65-F5344CB8AC3E}">
-        <p14:creationId xmlns:p14="http://schemas.microsoft.com/office/powerpoint/2010/main" val="78453344"/>
+        <p14:creationId xmlns:p14="http://schemas.microsoft.com/office/powerpoint/2010/main" val="1002214802"/>
       </p:ext>
     </p:extLst>
   </p:cSld>
@@ -7996,6 +8129,13 @@
     <a:masterClrMapping/>
   </p:clrMapOvr>
   <p:transition/>
+  <p:timing>
+    <p:tnLst>
+      <p:par>
+        <p:cTn id="1" dur="indefinite" restart="never" nodeType="tmRoot"/>
+      </p:par>
+    </p:tnLst>
+  </p:timing>
 </p:sld>
 </file>
 
@@ -8310,6 +8450,13 @@
   <p:clrMapOvr>
     <a:masterClrMapping/>
   </p:clrMapOvr>
+  <p:timing>
+    <p:tnLst>
+      <p:par>
+        <p:cTn id="1" dur="indefinite" restart="never" nodeType="tmRoot"/>
+      </p:par>
+    </p:tnLst>
+  </p:timing>
 </p:sld>
 </file>
 
@@ -8810,6 +8957,13 @@
     <a:masterClrMapping/>
   </p:clrMapOvr>
   <p:transition/>
+  <p:timing>
+    <p:tnLst>
+      <p:par>
+        <p:cTn id="1" dur="indefinite" restart="never" nodeType="tmRoot"/>
+      </p:par>
+    </p:tnLst>
+  </p:timing>
 </p:sld>
 </file>
 
@@ -8928,6 +9082,13 @@
     <a:masterClrMapping/>
   </p:clrMapOvr>
   <p:transition/>
+  <p:timing>
+    <p:tnLst>
+      <p:par>
+        <p:cTn id="1" dur="indefinite" restart="never" nodeType="tmRoot"/>
+      </p:par>
+    </p:tnLst>
+  </p:timing>
 </p:sld>
 </file>
 
@@ -9381,6 +9542,13 @@
     <a:masterClrMapping/>
   </p:clrMapOvr>
   <p:transition/>
+  <p:timing>
+    <p:tnLst>
+      <p:par>
+        <p:cTn id="1" dur="indefinite" restart="never" nodeType="tmRoot"/>
+      </p:par>
+    </p:tnLst>
+  </p:timing>
 </p:sld>
 </file>
 
@@ -9911,6 +10079,13 @@
     <a:masterClrMapping/>
   </p:clrMapOvr>
   <p:transition/>
+  <p:timing>
+    <p:tnLst>
+      <p:par>
+        <p:cTn id="1" dur="indefinite" restart="never" nodeType="tmRoot"/>
+      </p:par>
+    </p:tnLst>
+  </p:timing>
 </p:sld>
 </file>
 
@@ -10411,6 +10586,13 @@
     <a:masterClrMapping/>
   </p:clrMapOvr>
   <p:transition/>
+  <p:timing>
+    <p:tnLst>
+      <p:par>
+        <p:cTn id="1" dur="indefinite" restart="never" nodeType="tmRoot"/>
+      </p:par>
+    </p:tnLst>
+  </p:timing>
 </p:sld>
 </file>
 
@@ -10864,6 +11046,13 @@
     <a:masterClrMapping/>
   </p:clrMapOvr>
   <p:transition/>
+  <p:timing>
+    <p:tnLst>
+      <p:par>
+        <p:cTn id="1" dur="indefinite" restart="never" nodeType="tmRoot"/>
+      </p:par>
+    </p:tnLst>
+  </p:timing>
 </p:sld>
 </file>
 
@@ -11436,6 +11625,13 @@
     <a:masterClrMapping/>
   </p:clrMapOvr>
   <p:transition/>
+  <p:timing>
+    <p:tnLst>
+      <p:par>
+        <p:cTn id="1" dur="indefinite" restart="never" nodeType="tmRoot"/>
+      </p:par>
+    </p:tnLst>
+  </p:timing>
 </p:sld>
 </file>
 
@@ -11936,6 +12132,13 @@
     <a:masterClrMapping/>
   </p:clrMapOvr>
   <p:transition/>
+  <p:timing>
+    <p:tnLst>
+      <p:par>
+        <p:cTn id="1" dur="indefinite" restart="never" nodeType="tmRoot"/>
+      </p:par>
+    </p:tnLst>
+  </p:timing>
 </p:sld>
 </file>
 
@@ -12389,6 +12592,13 @@
     <a:masterClrMapping/>
   </p:clrMapOvr>
   <p:transition/>
+  <p:timing>
+    <p:tnLst>
+      <p:par>
+        <p:cTn id="1" dur="indefinite" restart="never" nodeType="tmRoot"/>
+      </p:par>
+    </p:tnLst>
+  </p:timing>
 </p:sld>
 </file>
 
@@ -12414,7 +12624,7 @@
           <p:cNvPr id="2" name="Title 1">
             <a:extLst>
               <a:ext uri="{FF2B5EF4-FFF2-40B4-BE49-F238E27FC236}">
-                <a16:creationId xmlns:a16="http://schemas.microsoft.com/office/drawing/2014/main" id="{71808648-1916-4FA6-89D2-BCBB14FC432B}"/>
+                <a16:creationId xmlns:a16="http://schemas.microsoft.com/office/drawing/2014/main" xmlns="" id="{71808648-1916-4FA6-89D2-BCBB14FC432B}"/>
               </a:ext>
             </a:extLst>
           </p:cNvPr>
@@ -12439,7 +12649,7 @@
           <p:cNvPr id="3" name="Content Placeholder 2">
             <a:extLst>
               <a:ext uri="{FF2B5EF4-FFF2-40B4-BE49-F238E27FC236}">
-                <a16:creationId xmlns:a16="http://schemas.microsoft.com/office/drawing/2014/main" id="{9AA6855F-DFA8-40E2-89E9-A3ED9E7CF573}"/>
+                <a16:creationId xmlns:a16="http://schemas.microsoft.com/office/drawing/2014/main" xmlns="" id="{9AA6855F-DFA8-40E2-89E9-A3ED9E7CF573}"/>
               </a:ext>
             </a:extLst>
           </p:cNvPr>
@@ -12469,6 +12679,13 @@
   <p:clrMapOvr>
     <a:masterClrMapping/>
   </p:clrMapOvr>
+  <p:timing>
+    <p:tnLst>
+      <p:par>
+        <p:cTn id="1" dur="indefinite" restart="never" nodeType="tmRoot"/>
+      </p:par>
+    </p:tnLst>
+  </p:timing>
 </p:sld>
 </file>
 
@@ -13027,6 +13244,13 @@
     <a:masterClrMapping/>
   </p:clrMapOvr>
   <p:transition/>
+  <p:timing>
+    <p:tnLst>
+      <p:par>
+        <p:cTn id="1" dur="indefinite" restart="never" nodeType="tmRoot"/>
+      </p:par>
+    </p:tnLst>
+  </p:timing>
 </p:sld>
 </file>
 
@@ -13403,25 +13627,18 @@
               <a:t>tràn</a:t>
             </a:r>
             <a:r>
-              <a:rPr lang="en-US" sz="5400" b="1" dirty="0">
+              <a:rPr lang="en-US" sz="5400" b="1">
                 <a:latin typeface="Times New Roman" panose="02020603050405020304" pitchFamily="18" charset="0"/>
                 <a:cs typeface="Times New Roman" panose="02020603050405020304" pitchFamily="18" charset="0"/>
               </a:rPr>
               <a:t>. </a:t>
             </a:r>
             <a:r>
-              <a:rPr lang="en-US" sz="5400" b="1" dirty="0" err="1">
-                <a:latin typeface="Times New Roman" panose="02020603050405020304" pitchFamily="18" charset="0"/>
-                <a:cs typeface="Times New Roman" panose="02020603050405020304" pitchFamily="18" charset="0"/>
-              </a:rPr>
-              <a:t>Cháu</a:t>
-            </a:r>
-            <a:r>
-              <a:rPr lang="en-US" sz="5400" b="1" dirty="0">
-                <a:latin typeface="Times New Roman" panose="02020603050405020304" pitchFamily="18" charset="0"/>
-                <a:cs typeface="Times New Roman" panose="02020603050405020304" pitchFamily="18" charset="0"/>
-              </a:rPr>
-              <a:t> </a:t>
+              <a:rPr lang="en-US" sz="5400" b="1" smtClean="0">
+                <a:latin typeface="Times New Roman" panose="02020603050405020304" pitchFamily="18" charset="0"/>
+                <a:cs typeface="Times New Roman" panose="02020603050405020304" pitchFamily="18" charset="0"/>
+              </a:rPr>
+              <a:t>Chúa </a:t>
             </a:r>
             <a:r>
               <a:rPr lang="en-US" sz="5400" b="1" dirty="0" err="1">
@@ -13556,6 +13773,13 @@
     <a:masterClrMapping/>
   </p:clrMapOvr>
   <p:transition/>
+  <p:timing>
+    <p:tnLst>
+      <p:par>
+        <p:cTn id="1" dur="indefinite" restart="never" nodeType="tmRoot"/>
+      </p:par>
+    </p:tnLst>
+  </p:timing>
 </p:sld>
 </file>
 
@@ -13674,6 +13898,13 @@
     <a:masterClrMapping/>
   </p:clrMapOvr>
   <p:transition/>
+  <p:timing>
+    <p:tnLst>
+      <p:par>
+        <p:cTn id="1" dur="indefinite" restart="never" nodeType="tmRoot"/>
+      </p:par>
+    </p:tnLst>
+  </p:timing>
 </p:sld>
 </file>
 
@@ -14225,6 +14456,13 @@
     <a:masterClrMapping/>
   </p:clrMapOvr>
   <p:transition/>
+  <p:timing>
+    <p:tnLst>
+      <p:par>
+        <p:cTn id="1" dur="indefinite" restart="never" nodeType="tmRoot"/>
+      </p:par>
+    </p:tnLst>
+  </p:timing>
 </p:sld>
 </file>
 
@@ -14755,6 +14993,13 @@
     <a:masterClrMapping/>
   </p:clrMapOvr>
   <p:transition/>
+  <p:timing>
+    <p:tnLst>
+      <p:par>
+        <p:cTn id="1" dur="indefinite" restart="never" nodeType="tmRoot"/>
+      </p:par>
+    </p:tnLst>
+  </p:timing>
 </p:sld>
 </file>
 
@@ -15131,25 +15376,18 @@
               <a:t>tràn</a:t>
             </a:r>
             <a:r>
-              <a:rPr lang="en-US" sz="5400" b="1" dirty="0">
+              <a:rPr lang="en-US" sz="5400" b="1">
                 <a:latin typeface="Times New Roman" panose="02020603050405020304" pitchFamily="18" charset="0"/>
                 <a:cs typeface="Times New Roman" panose="02020603050405020304" pitchFamily="18" charset="0"/>
               </a:rPr>
               <a:t>. </a:t>
             </a:r>
             <a:r>
-              <a:rPr lang="en-US" sz="5400" b="1" dirty="0" err="1">
-                <a:latin typeface="Times New Roman" panose="02020603050405020304" pitchFamily="18" charset="0"/>
-                <a:cs typeface="Times New Roman" panose="02020603050405020304" pitchFamily="18" charset="0"/>
-              </a:rPr>
-              <a:t>Cháu</a:t>
-            </a:r>
-            <a:r>
-              <a:rPr lang="en-US" sz="5400" b="1" dirty="0">
-                <a:latin typeface="Times New Roman" panose="02020603050405020304" pitchFamily="18" charset="0"/>
-                <a:cs typeface="Times New Roman" panose="02020603050405020304" pitchFamily="18" charset="0"/>
-              </a:rPr>
-              <a:t> </a:t>
+              <a:rPr lang="en-US" sz="5400" b="1" smtClean="0">
+                <a:latin typeface="Times New Roman" panose="02020603050405020304" pitchFamily="18" charset="0"/>
+                <a:cs typeface="Times New Roman" panose="02020603050405020304" pitchFamily="18" charset="0"/>
+              </a:rPr>
+              <a:t>Chúa </a:t>
             </a:r>
             <a:r>
               <a:rPr lang="en-US" sz="5400" b="1" dirty="0" err="1">
@@ -15284,6 +15522,13 @@
     <a:masterClrMapping/>
   </p:clrMapOvr>
   <p:transition/>
+  <p:timing>
+    <p:tnLst>
+      <p:par>
+        <p:cTn id="1" dur="indefinite" restart="never" nodeType="tmRoot"/>
+      </p:par>
+    </p:tnLst>
+  </p:timing>
 </p:sld>
 </file>
 
@@ -15835,6 +16080,13 @@
     <a:masterClrMapping/>
   </p:clrMapOvr>
   <p:transition/>
+  <p:timing>
+    <p:tnLst>
+      <p:par>
+        <p:cTn id="1" dur="indefinite" restart="never" nodeType="tmRoot"/>
+      </p:par>
+    </p:tnLst>
+  </p:timing>
 </p:sld>
 </file>
 
@@ -16114,25 +16366,18 @@
               <a:t>vui</a:t>
             </a:r>
             <a:r>
-              <a:rPr lang="en-US" sz="5400" b="1" dirty="0">
+              <a:rPr lang="en-US" sz="5400" b="1">
                 <a:latin typeface="Times New Roman" panose="02020603050405020304" pitchFamily="18" charset="0"/>
                 <a:cs typeface="Times New Roman" panose="02020603050405020304" pitchFamily="18" charset="0"/>
               </a:rPr>
               <a:t>, </a:t>
             </a:r>
             <a:r>
-              <a:rPr lang="en-US" sz="5400" b="1" dirty="0" err="1">
-                <a:latin typeface="Times New Roman" panose="02020603050405020304" pitchFamily="18" charset="0"/>
-                <a:cs typeface="Times New Roman" panose="02020603050405020304" pitchFamily="18" charset="0"/>
-              </a:rPr>
-              <a:t>hãy</a:t>
-            </a:r>
-            <a:r>
-              <a:rPr lang="en-US" sz="5400" b="1" dirty="0">
-                <a:latin typeface="Times New Roman" panose="02020603050405020304" pitchFamily="18" charset="0"/>
-                <a:cs typeface="Times New Roman" panose="02020603050405020304" pitchFamily="18" charset="0"/>
-              </a:rPr>
-              <a:t> </a:t>
+              <a:rPr lang="en-US" sz="5400" b="1" smtClean="0">
+                <a:latin typeface="Times New Roman" panose="02020603050405020304" pitchFamily="18" charset="0"/>
+                <a:cs typeface="Times New Roman" panose="02020603050405020304" pitchFamily="18" charset="0"/>
+              </a:rPr>
+              <a:t>hay </a:t>
             </a:r>
             <a:r>
               <a:rPr lang="en-US" sz="5400" b="1" dirty="0" err="1">
@@ -16365,6 +16610,13 @@
     <a:masterClrMapping/>
   </p:clrMapOvr>
   <p:transition/>
+  <p:timing>
+    <p:tnLst>
+      <p:par>
+        <p:cTn id="1" dur="indefinite" restart="never" nodeType="tmRoot"/>
+      </p:par>
+    </p:tnLst>
+  </p:timing>
 </p:sld>
 </file>
 
@@ -16741,25 +16993,18 @@
               <a:t>tràn</a:t>
             </a:r>
             <a:r>
-              <a:rPr lang="en-US" sz="5400" b="1" dirty="0">
+              <a:rPr lang="en-US" sz="5400" b="1">
                 <a:latin typeface="Times New Roman" panose="02020603050405020304" pitchFamily="18" charset="0"/>
                 <a:cs typeface="Times New Roman" panose="02020603050405020304" pitchFamily="18" charset="0"/>
               </a:rPr>
               <a:t>. </a:t>
             </a:r>
             <a:r>
-              <a:rPr lang="en-US" sz="5400" b="1" dirty="0" err="1">
-                <a:latin typeface="Times New Roman" panose="02020603050405020304" pitchFamily="18" charset="0"/>
-                <a:cs typeface="Times New Roman" panose="02020603050405020304" pitchFamily="18" charset="0"/>
-              </a:rPr>
-              <a:t>Cháu</a:t>
-            </a:r>
-            <a:r>
-              <a:rPr lang="en-US" sz="5400" b="1" dirty="0">
-                <a:latin typeface="Times New Roman" panose="02020603050405020304" pitchFamily="18" charset="0"/>
-                <a:cs typeface="Times New Roman" panose="02020603050405020304" pitchFamily="18" charset="0"/>
-              </a:rPr>
-              <a:t> </a:t>
+              <a:rPr lang="en-US" sz="5400" b="1" smtClean="0">
+                <a:latin typeface="Times New Roman" panose="02020603050405020304" pitchFamily="18" charset="0"/>
+                <a:cs typeface="Times New Roman" panose="02020603050405020304" pitchFamily="18" charset="0"/>
+              </a:rPr>
+              <a:t>Chúa </a:t>
             </a:r>
             <a:r>
               <a:rPr lang="en-US" sz="5400" b="1" dirty="0" err="1">
@@ -16894,6 +17139,13 @@
     <a:masterClrMapping/>
   </p:clrMapOvr>
   <p:transition/>
+  <p:timing>
+    <p:tnLst>
+      <p:par>
+        <p:cTn id="1" dur="indefinite" restart="never" nodeType="tmRoot"/>
+      </p:par>
+    </p:tnLst>
+  </p:timing>
 </p:sld>
 </file>
 
@@ -18407,25 +18659,18 @@
               <a:t>tràn</a:t>
             </a:r>
             <a:r>
-              <a:rPr lang="en-US" sz="5400" b="1" dirty="0">
+              <a:rPr lang="en-US" sz="5400" b="1">
                 <a:latin typeface="Times New Roman" panose="02020603050405020304" pitchFamily="18" charset="0"/>
                 <a:cs typeface="Times New Roman" panose="02020603050405020304" pitchFamily="18" charset="0"/>
               </a:rPr>
               <a:t>. </a:t>
             </a:r>
             <a:r>
-              <a:rPr lang="en-US" sz="5400" b="1" dirty="0" err="1">
-                <a:latin typeface="Times New Roman" panose="02020603050405020304" pitchFamily="18" charset="0"/>
-                <a:cs typeface="Times New Roman" panose="02020603050405020304" pitchFamily="18" charset="0"/>
-              </a:rPr>
-              <a:t>Cháu</a:t>
-            </a:r>
-            <a:r>
-              <a:rPr lang="en-US" sz="5400" b="1" dirty="0">
-                <a:latin typeface="Times New Roman" panose="02020603050405020304" pitchFamily="18" charset="0"/>
-                <a:cs typeface="Times New Roman" panose="02020603050405020304" pitchFamily="18" charset="0"/>
-              </a:rPr>
-              <a:t> </a:t>
+              <a:rPr lang="en-US" sz="5400" b="1" smtClean="0">
+                <a:latin typeface="Times New Roman" panose="02020603050405020304" pitchFamily="18" charset="0"/>
+                <a:cs typeface="Times New Roman" panose="02020603050405020304" pitchFamily="18" charset="0"/>
+              </a:rPr>
+              <a:t>Chúa </a:t>
             </a:r>
             <a:r>
               <a:rPr lang="en-US" sz="5400" b="1" dirty="0" err="1">
@@ -19111,6 +19356,13 @@
     <a:masterClrMapping/>
   </p:clrMapOvr>
   <p:transition/>
+  <p:timing>
+    <p:tnLst>
+      <p:par>
+        <p:cTn id="1" dur="indefinite" restart="never" nodeType="tmRoot"/>
+      </p:par>
+    </p:tnLst>
+  </p:timing>
 </p:sld>
 </file>
 
@@ -19243,6 +19495,13 @@
     <a:masterClrMapping/>
   </p:clrMapOvr>
   <p:transition/>
+  <p:timing>
+    <p:tnLst>
+      <p:par>
+        <p:cTn id="1" dur="indefinite" restart="never" nodeType="tmRoot"/>
+      </p:par>
+    </p:tnLst>
+  </p:timing>
 </p:sld>
 </file>
 
@@ -19268,7 +19527,7 @@
           <p:cNvPr id="2" name="Title 1">
             <a:extLst>
               <a:ext uri="{FF2B5EF4-FFF2-40B4-BE49-F238E27FC236}">
-                <a16:creationId xmlns:a16="http://schemas.microsoft.com/office/drawing/2014/main" id="{F393BC44-BAAB-4AA2-8CED-75EC43411B04}"/>
+                <a16:creationId xmlns:a16="http://schemas.microsoft.com/office/drawing/2014/main" xmlns="" id="{F393BC44-BAAB-4AA2-8CED-75EC43411B04}"/>
               </a:ext>
             </a:extLst>
           </p:cNvPr>
@@ -19293,7 +19552,7 @@
           <p:cNvPr id="3" name="Content Placeholder 2">
             <a:extLst>
               <a:ext uri="{FF2B5EF4-FFF2-40B4-BE49-F238E27FC236}">
-                <a16:creationId xmlns:a16="http://schemas.microsoft.com/office/drawing/2014/main" id="{4F07F7ED-1A02-466C-BE6D-20FA1A152B52}"/>
+                <a16:creationId xmlns:a16="http://schemas.microsoft.com/office/drawing/2014/main" xmlns="" id="{4F07F7ED-1A02-466C-BE6D-20FA1A152B52}"/>
               </a:ext>
             </a:extLst>
           </p:cNvPr>
@@ -19323,6 +19582,13 @@
   <p:clrMapOvr>
     <a:masterClrMapping/>
   </p:clrMapOvr>
+  <p:timing>
+    <p:tnLst>
+      <p:par>
+        <p:cTn id="1" dur="indefinite" restart="never" nodeType="tmRoot"/>
+      </p:par>
+    </p:tnLst>
+  </p:timing>
 </p:sld>
 </file>
 
@@ -19488,6 +19754,13 @@
     <a:masterClrMapping/>
   </p:clrMapOvr>
   <p:transition/>
+  <p:timing>
+    <p:tnLst>
+      <p:par>
+        <p:cTn id="1" dur="indefinite" restart="never" nodeType="tmRoot"/>
+      </p:par>
+    </p:tnLst>
+  </p:timing>
 </p:sld>
 </file>
 
@@ -19687,6 +19960,13 @@
     <a:masterClrMapping/>
   </p:clrMapOvr>
   <p:transition/>
+  <p:timing>
+    <p:tnLst>
+      <p:par>
+        <p:cTn id="1" dur="indefinite" restart="never" nodeType="tmRoot"/>
+      </p:par>
+    </p:tnLst>
+  </p:timing>
 </p:sld>
 </file>
 
@@ -19816,6 +20096,13 @@
     <a:masterClrMapping/>
   </p:clrMapOvr>
   <p:transition/>
+  <p:timing>
+    <p:tnLst>
+      <p:par>
+        <p:cTn id="1" dur="indefinite" restart="never" nodeType="tmRoot"/>
+      </p:par>
+    </p:tnLst>
+  </p:timing>
 </p:sld>
 </file>
 
@@ -19841,7 +20128,7 @@
           <p:cNvPr id="2" name="Title 1">
             <a:extLst>
               <a:ext uri="{FF2B5EF4-FFF2-40B4-BE49-F238E27FC236}">
-                <a16:creationId xmlns:a16="http://schemas.microsoft.com/office/drawing/2014/main" id="{E15707EB-D7C8-4315-861E-0C0D881BA228}"/>
+                <a16:creationId xmlns:a16="http://schemas.microsoft.com/office/drawing/2014/main" xmlns="" id="{E15707EB-D7C8-4315-861E-0C0D881BA228}"/>
               </a:ext>
             </a:extLst>
           </p:cNvPr>
@@ -19866,7 +20153,7 @@
           <p:cNvPr id="3" name="Content Placeholder 2">
             <a:extLst>
               <a:ext uri="{FF2B5EF4-FFF2-40B4-BE49-F238E27FC236}">
-                <a16:creationId xmlns:a16="http://schemas.microsoft.com/office/drawing/2014/main" id="{580A1A79-EAAF-4BC4-8937-5CA2ACF0C6C3}"/>
+                <a16:creationId xmlns:a16="http://schemas.microsoft.com/office/drawing/2014/main" xmlns="" id="{580A1A79-EAAF-4BC4-8937-5CA2ACF0C6C3}"/>
               </a:ext>
             </a:extLst>
           </p:cNvPr>
@@ -19896,6 +20183,13 @@
   <p:clrMapOvr>
     <a:masterClrMapping/>
   </p:clrMapOvr>
+  <p:timing>
+    <p:tnLst>
+      <p:par>
+        <p:cTn id="1" dur="indefinite" restart="never" nodeType="tmRoot"/>
+      </p:par>
+    </p:tnLst>
+  </p:timing>
 </p:sld>
 </file>
 
@@ -20061,6 +20355,13 @@
     <a:masterClrMapping/>
   </p:clrMapOvr>
   <p:transition/>
+  <p:timing>
+    <p:tnLst>
+      <p:par>
+        <p:cTn id="1" dur="indefinite" restart="never" nodeType="tmRoot"/>
+      </p:par>
+    </p:tnLst>
+  </p:timing>
 </p:sld>
 </file>
 
@@ -20252,6 +20553,13 @@
     <a:masterClrMapping/>
   </p:clrMapOvr>
   <p:transition/>
+  <p:timing>
+    <p:tnLst>
+      <p:par>
+        <p:cTn id="1" dur="indefinite" restart="never" nodeType="tmRoot"/>
+      </p:par>
+    </p:tnLst>
+  </p:timing>
 </p:sld>
 </file>
 
@@ -20260,7 +20568,7 @@
   <a:themeElements>
     <a:clrScheme name="Office Theme">
       <a:dk1>
-        <a:sysClr val="windowText" lastClr="000000"/>
+        <a:sysClr val="windowText" lastClr="1F1F1F"/>
       </a:dk1>
       <a:lt1>
         <a:sysClr val="window" lastClr="FFFFFF"/>
@@ -20510,7 +20818,7 @@
   <a:extraClrSchemeLst/>
   <a:extLst>
     <a:ext uri="{05A4C25C-085E-4340-85A3-A5531E510DB2}">
-      <thm15:themeFamily xmlns:thm15="http://schemas.microsoft.com/office/thememl/2012/main" name="Office Theme" id="{62F939B6-93AF-4DB8-9C6B-D6C7DFDC589F}" vid="{4A3C46E8-61CC-4603-A589-7422A47A8E4A}"/>
+      <thm15:themeFamily xmlns:thm15="http://schemas.microsoft.com/office/thememl/2012/main" xmlns="" name="Office Theme" id="{62F939B6-93AF-4DB8-9C6B-D6C7DFDC589F}" vid="{4A3C46E8-61CC-4603-A589-7422A47A8E4A}"/>
     </a:ext>
   </a:extLst>
 </a:theme>
@@ -20521,7 +20829,7 @@
   <a:themeElements>
     <a:clrScheme name="Office">
       <a:dk1>
-        <a:sysClr val="windowText" lastClr="000000"/>
+        <a:sysClr val="windowText" lastClr="1F1F1F"/>
       </a:dk1>
       <a:lt1>
         <a:sysClr val="window" lastClr="FFFFFF"/>
@@ -20771,7 +21079,7 @@
   <a:extraClrSchemeLst/>
   <a:extLst>
     <a:ext uri="{05A4C25C-085E-4340-85A3-A5531E510DB2}">
-      <thm15:themeFamily xmlns:thm15="http://schemas.microsoft.com/office/thememl/2012/main" name="Office Theme" id="{62F939B6-93AF-4DB8-9C6B-D6C7DFDC589F}" vid="{4A3C46E8-61CC-4603-A589-7422A47A8E4A}"/>
+      <thm15:themeFamily xmlns:thm15="http://schemas.microsoft.com/office/thememl/2012/main" xmlns="" name="Office Theme" id="{62F939B6-93AF-4DB8-9C6B-D6C7DFDC589F}" vid="{4A3C46E8-61CC-4603-A589-7422A47A8E4A}"/>
     </a:ext>
   </a:extLst>
 </a:theme>

</xml_diff>